<commit_message>
Updated my (Zackary Gill's) powerpoint with youtube link.
</commit_message>
<xml_diff>
--- a/pres/ZGill_CaseStudy1_Pres2.pptx
+++ b/pres/ZGill_CaseStudy1_Pres2.pptx
@@ -6397,6 +6397,17 @@
             </a:pPr>
             <a:r>
               <a:rPr lang="en" sz="2200" b="1" dirty="0" smtClean="0"/>
+              <a:t>Event Location</a:t>
+            </a:r>
+            <a:r>
+              <a:rPr lang="en" sz="2200" b="1" dirty="0" smtClean="0"/>
+              <a:t/>
+            </a:r>
+            <a:br>
+              <a:rPr lang="en" sz="2200" b="1" dirty="0" smtClean="0"/>
+            </a:br>
+            <a:r>
+              <a:rPr lang="en" sz="2200" b="1" dirty="0" smtClean="0"/>
               <a:t>Recommendations</a:t>
             </a:r>
             <a:endParaRPr sz="2200" b="1" dirty="0"/>
@@ -7390,12 +7401,15 @@
             </a:pPr>
             <a:r>
               <a:rPr lang="en-US" sz="1600" dirty="0"/>
-              <a:t>https://youtu.be/zXqku5JSQ3Y</a:t>
+              <a:t>https://</a:t>
             </a:r>
-            <a:endParaRPr lang="en-US" sz="1600" dirty="0" smtClean="0"/>
-          </a:p>
-          <a:p>
-            <a:pPr marL="63500" lvl="0" indent="0">
+            <a:r>
+              <a:rPr lang="en-US" sz="1600" dirty="0" smtClean="0"/>
+              <a:t>youtu.be/ppWbLjRWfIY</a:t>
+            </a:r>
+          </a:p>
+          <a:p>
+            <a:pPr marL="63500" indent="0">
               <a:buNone/>
             </a:pPr>
             <a:r>

</xml_diff>